<commit_message>
reordered simulation, removed 'clockwise' order references
</commit_message>
<xml_diff>
--- a/pictures/pdf/greedy1.pptx
+++ b/pictures/pdf/greedy1.pptx
@@ -109,7 +109,7 @@
   </p:defaultTextStyle>
   <p:extLst>
     <p:ext uri="{EFAFB233-063F-42B5-8137-9DF3F51BA10A}">
-      <p15:sldGuideLst xmlns:p15="http://schemas.microsoft.com/office/powerpoint/2012/main">
+      <p15:sldGuideLst xmlns="" xmlns:p15="http://schemas.microsoft.com/office/powerpoint/2012/main">
         <p15:guide id="1" orient="horz" pos="2739" userDrawn="1">
           <p15:clr>
             <a:srgbClr val="A4A3A4"/>
@@ -208,7 +208,7 @@
           <a:p>
             <a:fld id="{AE0D5B59-FC0E-446E-8413-2B00ADDB6388}" type="datetimeFigureOut">
               <a:rPr lang="en-US" smtClean="0"/>
-              <a:t>2/27/2017</a:t>
+              <a:t>2/28/17</a:t>
             </a:fld>
             <a:endParaRPr lang="en-US"/>
           </a:p>
@@ -303,7 +303,6 @@
               <a:rPr lang="en-US"/>
               <a:t>Fifth level</a:t>
             </a:r>
-            <a:endParaRPr lang="en-US"/>
           </a:p>
         </p:txBody>
       </p:sp>
@@ -744,7 +743,7 @@
           <a:p>
             <a:fld id="{62C34544-109E-374A-A6BF-6CE9DED3E76E}" type="datetimeFigureOut">
               <a:rPr lang="en-US" smtClean="0"/>
-              <a:t>2/27/2017</a:t>
+              <a:t>2/28/17</a:t>
             </a:fld>
             <a:endParaRPr lang="en-US"/>
           </a:p>
@@ -912,7 +911,7 @@
           <a:p>
             <a:fld id="{62C34544-109E-374A-A6BF-6CE9DED3E76E}" type="datetimeFigureOut">
               <a:rPr lang="en-US" smtClean="0"/>
-              <a:t>2/27/2017</a:t>
+              <a:t>2/28/17</a:t>
             </a:fld>
             <a:endParaRPr lang="en-US"/>
           </a:p>
@@ -1090,7 +1089,7 @@
           <a:p>
             <a:fld id="{62C34544-109E-374A-A6BF-6CE9DED3E76E}" type="datetimeFigureOut">
               <a:rPr lang="en-US" smtClean="0"/>
-              <a:t>2/27/2017</a:t>
+              <a:t>2/28/17</a:t>
             </a:fld>
             <a:endParaRPr lang="en-US"/>
           </a:p>
@@ -1258,7 +1257,7 @@
           <a:p>
             <a:fld id="{62C34544-109E-374A-A6BF-6CE9DED3E76E}" type="datetimeFigureOut">
               <a:rPr lang="en-US" smtClean="0"/>
-              <a:t>2/27/2017</a:t>
+              <a:t>2/28/17</a:t>
             </a:fld>
             <a:endParaRPr lang="en-US"/>
           </a:p>
@@ -1503,7 +1502,7 @@
           <a:p>
             <a:fld id="{62C34544-109E-374A-A6BF-6CE9DED3E76E}" type="datetimeFigureOut">
               <a:rPr lang="en-US" smtClean="0"/>
-              <a:t>2/27/2017</a:t>
+              <a:t>2/28/17</a:t>
             </a:fld>
             <a:endParaRPr lang="en-US"/>
           </a:p>
@@ -1788,7 +1787,7 @@
           <a:p>
             <a:fld id="{62C34544-109E-374A-A6BF-6CE9DED3E76E}" type="datetimeFigureOut">
               <a:rPr lang="en-US" smtClean="0"/>
-              <a:t>2/27/2017</a:t>
+              <a:t>2/28/17</a:t>
             </a:fld>
             <a:endParaRPr lang="en-US"/>
           </a:p>
@@ -2207,7 +2206,7 @@
           <a:p>
             <a:fld id="{62C34544-109E-374A-A6BF-6CE9DED3E76E}" type="datetimeFigureOut">
               <a:rPr lang="en-US" smtClean="0"/>
-              <a:t>2/27/2017</a:t>
+              <a:t>2/28/17</a:t>
             </a:fld>
             <a:endParaRPr lang="en-US"/>
           </a:p>
@@ -2324,7 +2323,7 @@
           <a:p>
             <a:fld id="{62C34544-109E-374A-A6BF-6CE9DED3E76E}" type="datetimeFigureOut">
               <a:rPr lang="en-US" smtClean="0"/>
-              <a:t>2/27/2017</a:t>
+              <a:t>2/28/17</a:t>
             </a:fld>
             <a:endParaRPr lang="en-US"/>
           </a:p>
@@ -2419,7 +2418,7 @@
           <a:p>
             <a:fld id="{62C34544-109E-374A-A6BF-6CE9DED3E76E}" type="datetimeFigureOut">
               <a:rPr lang="en-US" smtClean="0"/>
-              <a:t>2/27/2017</a:t>
+              <a:t>2/28/17</a:t>
             </a:fld>
             <a:endParaRPr lang="en-US"/>
           </a:p>
@@ -2694,7 +2693,7 @@
           <a:p>
             <a:fld id="{62C34544-109E-374A-A6BF-6CE9DED3E76E}" type="datetimeFigureOut">
               <a:rPr lang="en-US" smtClean="0"/>
-              <a:t>2/27/2017</a:t>
+              <a:t>2/28/17</a:t>
             </a:fld>
             <a:endParaRPr lang="en-US"/>
           </a:p>
@@ -2946,7 +2945,7 @@
           <a:p>
             <a:fld id="{62C34544-109E-374A-A6BF-6CE9DED3E76E}" type="datetimeFigureOut">
               <a:rPr lang="en-US" smtClean="0"/>
-              <a:t>2/27/2017</a:t>
+              <a:t>2/28/17</a:t>
             </a:fld>
             <a:endParaRPr lang="en-US"/>
           </a:p>
@@ -3157,7 +3156,7 @@
           <a:p>
             <a:fld id="{62C34544-109E-374A-A6BF-6CE9DED3E76E}" type="datetimeFigureOut">
               <a:rPr lang="en-US" smtClean="0"/>
-              <a:t>2/27/2017</a:t>
+              <a:t>2/28/17</a:t>
             </a:fld>
             <a:endParaRPr lang="en-US"/>
           </a:p>
@@ -3746,7 +3745,7 @@
         </p:nvSpPr>
         <p:spPr>
           <a:xfrm>
-            <a:off x="993183" y="1084760"/>
+            <a:off x="606573" y="1084760"/>
             <a:ext cx="376827" cy="378659"/>
           </a:xfrm>
           <a:prstGeom prst="rect">
@@ -4170,7 +4169,7 @@
         </p:nvSpPr>
         <p:spPr>
           <a:xfrm>
-            <a:off x="992958" y="3148177"/>
+            <a:off x="606348" y="3148177"/>
             <a:ext cx="376827" cy="378659"/>
           </a:xfrm>
           <a:prstGeom prst="rect">
@@ -4544,7 +4543,7 @@
         </p:nvSpPr>
         <p:spPr>
           <a:xfrm>
-            <a:off x="993407" y="5187010"/>
+            <a:off x="606797" y="5187010"/>
             <a:ext cx="376827" cy="370849"/>
           </a:xfrm>
           <a:prstGeom prst="rect">
@@ -4968,7 +4967,7 @@
         </p:nvSpPr>
         <p:spPr>
           <a:xfrm>
-            <a:off x="997850" y="7267409"/>
+            <a:off x="606722" y="7267409"/>
             <a:ext cx="372309" cy="384699"/>
           </a:xfrm>
           <a:prstGeom prst="rect">
@@ -5068,7 +5067,7 @@
         </p:nvSpPr>
         <p:spPr>
           <a:xfrm>
-            <a:off x="997850" y="6888992"/>
+            <a:off x="606722" y="6888992"/>
             <a:ext cx="381000" cy="381000"/>
           </a:xfrm>
           <a:prstGeom prst="ellipse">
@@ -5165,7 +5164,7 @@
         </p:nvSpPr>
         <p:spPr>
           <a:xfrm>
-            <a:off x="997850" y="7275409"/>
+            <a:off x="606722" y="7275409"/>
             <a:ext cx="373380" cy="362848"/>
           </a:xfrm>
           <a:prstGeom prst="ellipse">
@@ -5213,7 +5212,7 @@
         <p:spPr>
           <a:xfrm flipH="1">
             <a:off x="807720" y="1631916"/>
-            <a:ext cx="7238816" cy="15240"/>
+            <a:ext cx="7099145" cy="15240"/>
           </a:xfrm>
           <a:prstGeom prst="straightConnector1">
             <a:avLst/>
@@ -5249,8 +5248,8 @@
         </p:nvCxnSpPr>
         <p:spPr>
           <a:xfrm>
-            <a:off x="999854" y="2940464"/>
-            <a:ext cx="7255800" cy="24167"/>
+            <a:off x="1163497" y="2964631"/>
+            <a:ext cx="7108545" cy="0"/>
           </a:xfrm>
           <a:prstGeom prst="straightConnector1">
             <a:avLst/>
@@ -5286,12 +5285,12 @@
         </p:nvCxnSpPr>
         <p:spPr>
           <a:xfrm rot="10800000">
-            <a:off x="1181372" y="5372435"/>
-            <a:ext cx="6804389" cy="373963"/>
+            <a:off x="820838" y="5372437"/>
+            <a:ext cx="7086027" cy="373963"/>
           </a:xfrm>
           <a:prstGeom prst="bentConnector3">
             <a:avLst>
-              <a:gd name="adj1" fmla="val 100058"/>
+              <a:gd name="adj1" fmla="val 99953"/>
             </a:avLst>
           </a:prstGeom>
           <a:ln w="57150">
@@ -5339,7 +5338,7 @@
           <a:graphicData uri="http://schemas.openxmlformats.org/presentationml/2006/ole">
             <mc:AlternateContent xmlns:mc="http://schemas.openxmlformats.org/markup-compatibility/2006">
               <mc:Choice xmlns:v="urn:schemas-microsoft-com:vml" Requires="v">
-                <p:oleObj spid="_x0000_s2056" name="Document" r:id="rId4" imgW="5956042" imgH="2113760" progId="Word.Document.12">
+                <p:oleObj spid="_x0000_s2074" name="Document" r:id="rId4" imgW="5956042" imgH="2113760" progId="Word.Document.12">
                   <p:embed/>
                 </p:oleObj>
               </mc:Choice>
@@ -5396,7 +5395,7 @@
           <a:graphicData uri="http://schemas.openxmlformats.org/presentationml/2006/ole">
             <mc:AlternateContent xmlns:mc="http://schemas.openxmlformats.org/markup-compatibility/2006">
               <mc:Choice xmlns:v="urn:schemas-microsoft-com:vml" Requires="v">
-                <p:oleObj spid="_x0000_s2057" name="Document" r:id="rId6" imgW="5956042" imgH="2114120" progId="Word.Document.12">
+                <p:oleObj spid="_x0000_s2075" name="Document" r:id="rId6" imgW="5956042" imgH="2114120" progId="Word.Document.12">
                   <p:embed/>
                 </p:oleObj>
               </mc:Choice>
@@ -5453,7 +5452,7 @@
           <a:graphicData uri="http://schemas.openxmlformats.org/presentationml/2006/ole">
             <mc:AlternateContent xmlns:mc="http://schemas.openxmlformats.org/markup-compatibility/2006">
               <mc:Choice xmlns:v="urn:schemas-microsoft-com:vml" Requires="v">
-                <p:oleObj spid="_x0000_s2058" name="Document" r:id="rId8" imgW="5956042" imgH="2113760" progId="Word.Document.12">
+                <p:oleObj spid="_x0000_s2076" name="Document" r:id="rId8" imgW="5956042" imgH="2113760" progId="Word.Document.12">
                   <p:embed/>
                 </p:oleObj>
               </mc:Choice>
@@ -5510,7 +5509,7 @@
           <a:graphicData uri="http://schemas.openxmlformats.org/presentationml/2006/ole">
             <mc:AlternateContent xmlns:mc="http://schemas.openxmlformats.org/markup-compatibility/2006">
               <mc:Choice xmlns:v="urn:schemas-microsoft-com:vml" Requires="v">
-                <p:oleObj spid="_x0000_s2059" name="Document" r:id="rId10" imgW="5956042" imgH="2113760" progId="Word.Document.12">
+                <p:oleObj spid="_x0000_s2077" name="Document" r:id="rId10" imgW="5956042" imgH="2113760" progId="Word.Document.12">
                   <p:embed/>
                 </p:oleObj>
               </mc:Choice>
@@ -5567,7 +5566,7 @@
           <a:graphicData uri="http://schemas.openxmlformats.org/presentationml/2006/ole">
             <mc:AlternateContent xmlns:mc="http://schemas.openxmlformats.org/markup-compatibility/2006">
               <mc:Choice xmlns:v="urn:schemas-microsoft-com:vml" Requires="v">
-                <p:oleObj spid="_x0000_s2060" name="Document" r:id="rId11" imgW="5956042" imgH="2114120" progId="Word.Document.12">
+                <p:oleObj spid="_x0000_s2078" name="Document" r:id="rId11" imgW="5956042" imgH="2114120" progId="Word.Document.12">
                   <p:embed/>
                 </p:oleObj>
               </mc:Choice>
@@ -5624,7 +5623,7 @@
           <a:graphicData uri="http://schemas.openxmlformats.org/presentationml/2006/ole">
             <mc:AlternateContent xmlns:mc="http://schemas.openxmlformats.org/markup-compatibility/2006">
               <mc:Choice xmlns:v="urn:schemas-microsoft-com:vml" Requires="v">
-                <p:oleObj spid="_x0000_s2061" name="Document" r:id="rId12" imgW="5956042" imgH="2114120" progId="Word.Document.12">
+                <p:oleObj spid="_x0000_s2079" name="Document" r:id="rId12" imgW="5956042" imgH="2114120" progId="Word.Document.12">
                   <p:embed/>
                 </p:oleObj>
               </mc:Choice>
@@ -5668,20 +5667,20 @@
           <p:nvPr>
             <p:extLst>
               <p:ext uri="{D42A27DB-BD31-4B8C-83A1-F6EECF244321}">
-                <p14:modId xmlns:p14="http://schemas.microsoft.com/office/powerpoint/2010/main" val="2304772209"/>
+                <p14:modId xmlns:p14="http://schemas.microsoft.com/office/powerpoint/2010/main" val="2988368175"/>
               </p:ext>
             </p:extLst>
           </p:nvPr>
         </p:nvGraphicFramePr>
         <p:xfrm>
-          <a:off x="654951" y="6894838"/>
+          <a:off x="269833" y="6894838"/>
           <a:ext cx="1066800" cy="373062"/>
         </p:xfrm>
         <a:graphic>
           <a:graphicData uri="http://schemas.openxmlformats.org/presentationml/2006/ole">
             <mc:AlternateContent xmlns:mc="http://schemas.openxmlformats.org/markup-compatibility/2006">
               <mc:Choice xmlns:v="urn:schemas-microsoft-com:vml" Requires="v">
-                <p:oleObj spid="_x0000_s2062" name="Document" r:id="rId13" imgW="5956042" imgH="2113760" progId="Word.Document.12">
+                <p:oleObj spid="_x0000_s2080" name="Document" r:id="rId13" imgW="5956042" imgH="2113760" progId="Word.Document.12">
                   <p:embed/>
                 </p:oleObj>
               </mc:Choice>
@@ -5702,7 +5701,7 @@
                     </p:blipFill>
                     <p:spPr>
                       <a:xfrm>
-                        <a:off x="654951" y="6894838"/>
+                        <a:off x="269833" y="6894838"/>
                         <a:ext cx="1066800" cy="373062"/>
                       </a:xfrm>
                       <a:prstGeom prst="rect">
@@ -5725,20 +5724,20 @@
           <p:nvPr>
             <p:extLst>
               <p:ext uri="{D42A27DB-BD31-4B8C-83A1-F6EECF244321}">
-                <p14:modId xmlns:p14="http://schemas.microsoft.com/office/powerpoint/2010/main" val="3977135074"/>
+                <p14:modId xmlns:p14="http://schemas.microsoft.com/office/powerpoint/2010/main" val="612144612"/>
               </p:ext>
             </p:extLst>
           </p:nvPr>
         </p:nvGraphicFramePr>
         <p:xfrm>
-          <a:off x="685906" y="7267714"/>
+          <a:off x="300788" y="7267714"/>
           <a:ext cx="1004888" cy="357188"/>
         </p:xfrm>
         <a:graphic>
           <a:graphicData uri="http://schemas.openxmlformats.org/presentationml/2006/ole">
             <mc:AlternateContent xmlns:mc="http://schemas.openxmlformats.org/markup-compatibility/2006">
               <mc:Choice xmlns:v="urn:schemas-microsoft-com:vml" Requires="v">
-                <p:oleObj spid="_x0000_s2063" name="Document" r:id="rId14" imgW="5956042" imgH="2114120" progId="Word.Document.12">
+                <p:oleObj spid="_x0000_s2081" name="Document" r:id="rId14" imgW="5956042" imgH="2114120" progId="Word.Document.12">
                   <p:embed/>
                 </p:oleObj>
               </mc:Choice>
@@ -5759,7 +5758,7 @@
                     </p:blipFill>
                     <p:spPr>
                       <a:xfrm>
-                        <a:off x="685906" y="7267714"/>
+                        <a:off x="300788" y="7267714"/>
                         <a:ext cx="1004888" cy="357188"/>
                       </a:xfrm>
                       <a:prstGeom prst="rect">
@@ -6149,7 +6148,7 @@
     </a:clrScheme>
     <a:fontScheme name="Office">
       <a:majorFont>
-        <a:latin typeface="Calibri Light" panose="020F0302020204030204"/>
+        <a:latin typeface="Calibri Light"/>
         <a:ea typeface=""/>
         <a:cs typeface=""/>
         <a:font script="Jpan" typeface="游ゴシック Light"/>
@@ -6201,7 +6200,7 @@
         <a:font script="Tfng" typeface="Ebrima"/>
       </a:majorFont>
       <a:minorFont>
-        <a:latin typeface="Calibri" panose="020F0502020204030204"/>
+        <a:latin typeface="Calibri"/>
         <a:ea typeface=""/>
         <a:cs typeface=""/>
         <a:font script="Jpan" typeface="游ゴシック"/>
@@ -6395,7 +6394,7 @@
   <a:extraClrSchemeLst/>
   <a:extLst>
     <a:ext uri="{05A4C25C-085E-4340-85A3-A5531E510DB2}">
-      <thm15:themeFamily xmlns:thm15="http://schemas.microsoft.com/office/thememl/2012/main" name="Office Theme" id="{62F939B6-93AF-4DB8-9C6B-D6C7DFDC589F}" vid="{4A3C46E8-61CC-4603-A589-7422A47A8E4A}"/>
+      <thm15:themeFamily xmlns="" xmlns:thm15="http://schemas.microsoft.com/office/thememl/2012/main" name="Office Theme" id="{62F939B6-93AF-4DB8-9C6B-D6C7DFDC589F}" vid="{4A3C46E8-61CC-4603-A589-7422A47A8E4A}"/>
     </a:ext>
   </a:extLst>
 </a:theme>

</xml_diff>